<commit_message>
fixed the nodes and cleaed up things
</commit_message>
<xml_diff>
--- a/porjectPosterThing.pptx
+++ b/porjectPosterThing.pptx
@@ -6,12 +6,11 @@
   </p:sldMasterIdLst>
   <p:sldIdLst>
     <p:sldId id="256" r:id="rId2"/>
-    <p:sldId id="269" r:id="rId3"/>
+    <p:sldId id="268" r:id="rId3"/>
     <p:sldId id="278" r:id="rId4"/>
-    <p:sldId id="279" r:id="rId5"/>
-    <p:sldId id="282" r:id="rId6"/>
-    <p:sldId id="280" r:id="rId7"/>
-    <p:sldId id="281" r:id="rId8"/>
+    <p:sldId id="282" r:id="rId5"/>
+    <p:sldId id="280" r:id="rId6"/>
+    <p:sldId id="281" r:id="rId7"/>
   </p:sldIdLst>
   <p:sldSz cx="12192000" cy="6858000"/>
   <p:notesSz cx="6858000" cy="9144000"/>
@@ -7059,19 +7058,18 @@
           <a:lstStyle/>
           <a:p>
             <a:r>
-              <a:rPr lang="en-GB"/>
+              <a:rPr lang="en-GB" dirty="0"/>
               <a:t>The Idea</a:t>
             </a:r>
-            <a:endParaRPr lang="en-GB" dirty="0"/>
-          </a:p>
-        </p:txBody>
-      </p:sp>
-      <p:sp>
-        <p:nvSpPr>
-          <p:cNvPr id="6" name="Content Placeholder 5">
+          </a:p>
+        </p:txBody>
+      </p:sp>
+      <p:sp>
+        <p:nvSpPr>
+          <p:cNvPr id="3" name="Content Placeholder 2">
             <a:extLst>
               <a:ext uri="{FF2B5EF4-FFF2-40B4-BE49-F238E27FC236}">
-                <a16:creationId xmlns:a16="http://schemas.microsoft.com/office/drawing/2014/main" id="{B32A7746-5C8B-4F7B-993E-4647E11AA726}"/>
+                <a16:creationId xmlns:a16="http://schemas.microsoft.com/office/drawing/2014/main" id="{6FE23BC1-0B6E-413F-90C3-E92B246D07F7}"/>
               </a:ext>
             </a:extLst>
           </p:cNvPr>
@@ -7082,19 +7080,117 @@
             <p:ph idx="1"/>
           </p:nvPr>
         </p:nvSpPr>
-        <p:spPr/>
+        <p:spPr>
+          <a:xfrm>
+            <a:off x="677334" y="1748791"/>
+            <a:ext cx="8596668" cy="4292572"/>
+          </a:xfrm>
+        </p:spPr>
         <p:txBody>
           <a:bodyPr/>
           <a:lstStyle/>
           <a:p>
+            <a:r>
+              <a:rPr lang="en-GB" dirty="0"/>
+              <a:t>The average person can find it difficult to </a:t>
+            </a:r>
+          </a:p>
+          <a:p>
+            <a:pPr marL="0" indent="0">
+              <a:buNone/>
+            </a:pPr>
+            <a:r>
+              <a:rPr lang="en-GB" dirty="0"/>
+              <a:t>choose what to wear.</a:t>
+            </a:r>
+          </a:p>
+          <a:p>
             <a:endParaRPr lang="en-GB" dirty="0"/>
           </a:p>
-        </p:txBody>
-      </p:sp>
+          <a:p>
+            <a:r>
+              <a:rPr lang="en-GB" dirty="0"/>
+              <a:t>Today we are often overwhelmed by the </a:t>
+            </a:r>
+          </a:p>
+          <a:p>
+            <a:pPr marL="0" indent="0">
+              <a:buNone/>
+            </a:pPr>
+            <a:r>
+              <a:rPr lang="en-GB" dirty="0"/>
+              <a:t>amount of choice.</a:t>
+            </a:r>
+          </a:p>
+          <a:p>
+            <a:pPr marL="0" indent="0">
+              <a:buNone/>
+            </a:pPr>
+            <a:endParaRPr lang="en-GB" dirty="0"/>
+          </a:p>
+          <a:p>
+            <a:r>
+              <a:rPr lang="en-GB" dirty="0"/>
+              <a:t>Modern technology can be used to streamline </a:t>
+            </a:r>
+          </a:p>
+          <a:p>
+            <a:pPr marL="0" indent="0">
+              <a:buNone/>
+            </a:pPr>
+            <a:r>
+              <a:rPr lang="en-GB" dirty="0"/>
+              <a:t>this process.</a:t>
+            </a:r>
+          </a:p>
+          <a:p>
+            <a:pPr marL="0" indent="0">
+              <a:buNone/>
+            </a:pPr>
+            <a:endParaRPr lang="en-GB" dirty="0"/>
+          </a:p>
+        </p:txBody>
+      </p:sp>
+      <p:pic>
+        <p:nvPicPr>
+          <p:cNvPr id="5" name="Picture 4">
+            <a:extLst>
+              <a:ext uri="{FF2B5EF4-FFF2-40B4-BE49-F238E27FC236}">
+                <a16:creationId xmlns:a16="http://schemas.microsoft.com/office/drawing/2014/main" id="{C5CE3B2D-A96B-4839-A60B-584B61D7CA2E}"/>
+              </a:ext>
+            </a:extLst>
+          </p:cNvPr>
+          <p:cNvPicPr>
+            <a:picLocks noChangeAspect="1"/>
+          </p:cNvPicPr>
+          <p:nvPr/>
+        </p:nvPicPr>
+        <p:blipFill>
+          <a:blip r:embed="rId2">
+            <a:extLst>
+              <a:ext uri="{28A0092B-C50C-407E-A947-70E740481C1C}">
+                <a14:useLocalDpi xmlns:a14="http://schemas.microsoft.com/office/drawing/2010/main" val="0"/>
+              </a:ext>
+            </a:extLst>
+          </a:blip>
+          <a:stretch>
+            <a:fillRect/>
+          </a:stretch>
+        </p:blipFill>
+        <p:spPr>
+          <a:xfrm>
+            <a:off x="5829973" y="2091434"/>
+            <a:ext cx="3850475" cy="2675131"/>
+          </a:xfrm>
+          <a:prstGeom prst="rect">
+            <a:avLst/>
+          </a:prstGeom>
+        </p:spPr>
+      </p:pic>
     </p:spTree>
     <p:extLst>
       <p:ext uri="{BB962C8B-B14F-4D97-AF65-F5344CB8AC3E}">
-        <p14:creationId xmlns:p14="http://schemas.microsoft.com/office/powerpoint/2010/main" val="1196032664"/>
+        <p14:creationId xmlns:p14="http://schemas.microsoft.com/office/powerpoint/2010/main" val="1544071109"/>
       </p:ext>
     </p:extLst>
   </p:cSld>
@@ -7333,7 +7429,7 @@
           <p:cNvPr id="2" name="Title 1">
             <a:extLst>
               <a:ext uri="{FF2B5EF4-FFF2-40B4-BE49-F238E27FC236}">
-                <a16:creationId xmlns:a16="http://schemas.microsoft.com/office/drawing/2014/main" id="{B542C3E4-6EDA-49F3-8DAD-B6307579D6AF}"/>
+                <a16:creationId xmlns:a16="http://schemas.microsoft.com/office/drawing/2014/main" id="{65DE6543-2F7D-48D8-ACED-2279B79B067C}"/>
               </a:ext>
             </a:extLst>
           </p:cNvPr>
@@ -7351,7 +7447,77 @@
           <a:p>
             <a:r>
               <a:rPr lang="en-GB" dirty="0"/>
-              <a:t>My Innovation </a:t>
+              <a:t>The Neural Network</a:t>
+            </a:r>
+          </a:p>
+        </p:txBody>
+      </p:sp>
+      <p:pic>
+        <p:nvPicPr>
+          <p:cNvPr id="5" name="Content Placeholder 4" descr="Diagram&#10;&#10;Description automatically generated">
+            <a:extLst>
+              <a:ext uri="{FF2B5EF4-FFF2-40B4-BE49-F238E27FC236}">
+                <a16:creationId xmlns:a16="http://schemas.microsoft.com/office/drawing/2014/main" id="{9716C951-502F-4B74-B513-9A5EB4B6471A}"/>
+              </a:ext>
+            </a:extLst>
+          </p:cNvPr>
+          <p:cNvPicPr>
+            <a:picLocks noGrp="1" noChangeAspect="1"/>
+          </p:cNvPicPr>
+          <p:nvPr>
+            <p:ph idx="1"/>
+          </p:nvPr>
+        </p:nvPicPr>
+        <p:blipFill>
+          <a:blip r:embed="rId2">
+            <a:extLst>
+              <a:ext uri="{28A0092B-C50C-407E-A947-70E740481C1C}">
+                <a14:useLocalDpi xmlns:a14="http://schemas.microsoft.com/office/drawing/2010/main" val="0"/>
+              </a:ext>
+            </a:extLst>
+          </a:blip>
+          <a:stretch>
+            <a:fillRect/>
+          </a:stretch>
+        </p:blipFill>
+        <p:spPr>
+          <a:xfrm>
+            <a:off x="1589427" y="2002972"/>
+            <a:ext cx="7017295" cy="3842544"/>
+          </a:xfrm>
+        </p:spPr>
+      </p:pic>
+      <p:sp>
+        <p:nvSpPr>
+          <p:cNvPr id="4" name="TextBox 3">
+            <a:extLst>
+              <a:ext uri="{FF2B5EF4-FFF2-40B4-BE49-F238E27FC236}">
+                <a16:creationId xmlns:a16="http://schemas.microsoft.com/office/drawing/2014/main" id="{5783446A-9511-4CEE-9788-16049FAD322A}"/>
+              </a:ext>
+            </a:extLst>
+          </p:cNvPr>
+          <p:cNvSpPr txBox="1"/>
+          <p:nvPr/>
+        </p:nvSpPr>
+        <p:spPr>
+          <a:xfrm>
+            <a:off x="1080978" y="6063734"/>
+            <a:ext cx="8193024" cy="369332"/>
+          </a:xfrm>
+          <a:prstGeom prst="rect">
+            <a:avLst/>
+          </a:prstGeom>
+          <a:noFill/>
+        </p:spPr>
+        <p:txBody>
+          <a:bodyPr wrap="square" rtlCol="0">
+            <a:spAutoFit/>
+          </a:bodyPr>
+          <a:lstStyle/>
+          <a:p>
+            <a:r>
+              <a:rPr lang="en-GB" b="1" dirty="0"/>
+              <a:t>The basic model of the neural network which is implemented in the app</a:t>
             </a:r>
           </a:p>
         </p:txBody>
@@ -7359,7 +7525,7 @@
     </p:spTree>
     <p:extLst>
       <p:ext uri="{BB962C8B-B14F-4D97-AF65-F5344CB8AC3E}">
-        <p14:creationId xmlns:p14="http://schemas.microsoft.com/office/powerpoint/2010/main" val="1650445100"/>
+        <p14:creationId xmlns:p14="http://schemas.microsoft.com/office/powerpoint/2010/main" val="2079003164"/>
       </p:ext>
     </p:extLst>
   </p:cSld>
@@ -7391,134 +7557,6 @@
           <p:cNvPr id="2" name="Title 1">
             <a:extLst>
               <a:ext uri="{FF2B5EF4-FFF2-40B4-BE49-F238E27FC236}">
-                <a16:creationId xmlns:a16="http://schemas.microsoft.com/office/drawing/2014/main" id="{65DE6543-2F7D-48D8-ACED-2279B79B067C}"/>
-              </a:ext>
-            </a:extLst>
-          </p:cNvPr>
-          <p:cNvSpPr>
-            <a:spLocks noGrp="1"/>
-          </p:cNvSpPr>
-          <p:nvPr>
-            <p:ph type="title"/>
-          </p:nvPr>
-        </p:nvSpPr>
-        <p:spPr/>
-        <p:txBody>
-          <a:bodyPr/>
-          <a:lstStyle/>
-          <a:p>
-            <a:r>
-              <a:rPr lang="en-GB" dirty="0"/>
-              <a:t>The Neural Network</a:t>
-            </a:r>
-          </a:p>
-        </p:txBody>
-      </p:sp>
-      <p:pic>
-        <p:nvPicPr>
-          <p:cNvPr id="5" name="Content Placeholder 4" descr="Diagram&#10;&#10;Description automatically generated">
-            <a:extLst>
-              <a:ext uri="{FF2B5EF4-FFF2-40B4-BE49-F238E27FC236}">
-                <a16:creationId xmlns:a16="http://schemas.microsoft.com/office/drawing/2014/main" id="{9716C951-502F-4B74-B513-9A5EB4B6471A}"/>
-              </a:ext>
-            </a:extLst>
-          </p:cNvPr>
-          <p:cNvPicPr>
-            <a:picLocks noGrp="1" noChangeAspect="1"/>
-          </p:cNvPicPr>
-          <p:nvPr>
-            <p:ph idx="1"/>
-          </p:nvPr>
-        </p:nvPicPr>
-        <p:blipFill>
-          <a:blip r:embed="rId2">
-            <a:extLst>
-              <a:ext uri="{28A0092B-C50C-407E-A947-70E740481C1C}">
-                <a14:useLocalDpi xmlns:a14="http://schemas.microsoft.com/office/drawing/2010/main" val="0"/>
-              </a:ext>
-            </a:extLst>
-          </a:blip>
-          <a:stretch>
-            <a:fillRect/>
-          </a:stretch>
-        </p:blipFill>
-        <p:spPr>
-          <a:xfrm>
-            <a:off x="1589427" y="2002972"/>
-            <a:ext cx="7017295" cy="3842544"/>
-          </a:xfrm>
-        </p:spPr>
-      </p:pic>
-      <p:sp>
-        <p:nvSpPr>
-          <p:cNvPr id="4" name="TextBox 3">
-            <a:extLst>
-              <a:ext uri="{FF2B5EF4-FFF2-40B4-BE49-F238E27FC236}">
-                <a16:creationId xmlns:a16="http://schemas.microsoft.com/office/drawing/2014/main" id="{5783446A-9511-4CEE-9788-16049FAD322A}"/>
-              </a:ext>
-            </a:extLst>
-          </p:cNvPr>
-          <p:cNvSpPr txBox="1"/>
-          <p:nvPr/>
-        </p:nvSpPr>
-        <p:spPr>
-          <a:xfrm>
-            <a:off x="1080978" y="6063734"/>
-            <a:ext cx="8193024" cy="369332"/>
-          </a:xfrm>
-          <a:prstGeom prst="rect">
-            <a:avLst/>
-          </a:prstGeom>
-          <a:noFill/>
-        </p:spPr>
-        <p:txBody>
-          <a:bodyPr wrap="square" rtlCol="0">
-            <a:spAutoFit/>
-          </a:bodyPr>
-          <a:lstStyle/>
-          <a:p>
-            <a:r>
-              <a:rPr lang="en-GB" b="1" dirty="0"/>
-              <a:t>The basic model of the neural network which is implemented in the app</a:t>
-            </a:r>
-          </a:p>
-        </p:txBody>
-      </p:sp>
-    </p:spTree>
-    <p:extLst>
-      <p:ext uri="{BB962C8B-B14F-4D97-AF65-F5344CB8AC3E}">
-        <p14:creationId xmlns:p14="http://schemas.microsoft.com/office/powerpoint/2010/main" val="2079003164"/>
-      </p:ext>
-    </p:extLst>
-  </p:cSld>
-  <p:clrMapOvr>
-    <a:masterClrMapping/>
-  </p:clrMapOvr>
-</p:sld>
-</file>
-
-<file path=ppt/slides/slide6.xml><?xml version="1.0" encoding="utf-8"?>
-<p:sld xmlns:a="http://schemas.openxmlformats.org/drawingml/2006/main" xmlns:r="http://schemas.openxmlformats.org/officeDocument/2006/relationships" xmlns:p="http://schemas.openxmlformats.org/presentationml/2006/main">
-  <p:cSld>
-    <p:spTree>
-      <p:nvGrpSpPr>
-        <p:cNvPr id="1" name=""/>
-        <p:cNvGrpSpPr/>
-        <p:nvPr/>
-      </p:nvGrpSpPr>
-      <p:grpSpPr>
-        <a:xfrm>
-          <a:off x="0" y="0"/>
-          <a:ext cx="0" cy="0"/>
-          <a:chOff x="0" y="0"/>
-          <a:chExt cx="0" cy="0"/>
-        </a:xfrm>
-      </p:grpSpPr>
-      <p:sp>
-        <p:nvSpPr>
-          <p:cNvPr id="2" name="Title 1">
-            <a:extLst>
-              <a:ext uri="{FF2B5EF4-FFF2-40B4-BE49-F238E27FC236}">
                 <a16:creationId xmlns:a16="http://schemas.microsoft.com/office/drawing/2014/main" id="{046C8CA5-A2C3-4E80-9E68-CE4AFF6C5D76}"/>
               </a:ext>
             </a:extLst>
@@ -7620,7 +7658,7 @@
 </p:sld>
 </file>
 
-<file path=ppt/slides/slide7.xml><?xml version="1.0" encoding="utf-8"?>
+<file path=ppt/slides/slide6.xml><?xml version="1.0" encoding="utf-8"?>
 <p:sld xmlns:a="http://schemas.openxmlformats.org/drawingml/2006/main" xmlns:r="http://schemas.openxmlformats.org/officeDocument/2006/relationships" xmlns:p="http://schemas.openxmlformats.org/presentationml/2006/main">
   <p:cSld>
     <p:spTree>

</xml_diff>